<commit_message>
Added code examples to demo.
</commit_message>
<xml_diff>
--- a/examples/demo.pptx
+++ b/examples/demo.pptx
@@ -6,16 +6,22 @@
   </p:sldMasterIdLst>
   <p:sldIdLst>
     <p:sldId id="256" r:id="rId2"/>
-    <p:sldId id="264" r:id="rId3"/>
-    <p:sldId id="265" r:id="rId4"/>
-    <p:sldId id="266" r:id="rId5"/>
-    <p:sldId id="263" r:id="rId6"/>
-    <p:sldId id="260" r:id="rId7"/>
-    <p:sldId id="261" r:id="rId8"/>
-    <p:sldId id="262" r:id="rId9"/>
-    <p:sldId id="259" r:id="rId10"/>
-    <p:sldId id="257" r:id="rId11"/>
-    <p:sldId id="258" r:id="rId12"/>
+    <p:sldId id="268" r:id="rId3"/>
+    <p:sldId id="269" r:id="rId4"/>
+    <p:sldId id="270" r:id="rId5"/>
+    <p:sldId id="271" r:id="rId6"/>
+    <p:sldId id="272" r:id="rId7"/>
+    <p:sldId id="273" r:id="rId8"/>
+    <p:sldId id="264" r:id="rId9"/>
+    <p:sldId id="265" r:id="rId10"/>
+    <p:sldId id="266" r:id="rId11"/>
+    <p:sldId id="263" r:id="rId12"/>
+    <p:sldId id="260" r:id="rId13"/>
+    <p:sldId id="261" r:id="rId14"/>
+    <p:sldId id="262" r:id="rId15"/>
+    <p:sldId id="259" r:id="rId16"/>
+    <p:sldId id="257" r:id="rId17"/>
+    <p:sldId id="258" r:id="rId18"/>
   </p:sldIdLst>
   <p:sldSz cx="9144000" cy="6858000" type="screen4x3"/>
   <p:notesSz cx="6858000" cy="9144000"/>
@@ -3212,6 +3218,579 @@
         </p:nvSpPr>
         <p:spPr/>
         <p:txBody>
+          <a:bodyPr/>
+          <a:lstStyle/>
+          <a:p>
+            <a:r>
+              <a:rPr lang="en-US" dirty="0" smtClean="0"/>
+              <a:t>Lido </a:t>
+            </a:r>
+            <a:r>
+              <a:rPr lang="mr-IN" dirty="0" smtClean="0"/>
+              <a:t>–</a:t>
+            </a:r>
+            <a:r>
+              <a:rPr lang="en-US" dirty="0" smtClean="0"/>
+              <a:t> “Citi Bike”</a:t>
+            </a:r>
+            <a:endParaRPr lang="en-US" dirty="0"/>
+          </a:p>
+        </p:txBody>
+      </p:sp>
+      <p:pic>
+        <p:nvPicPr>
+          <p:cNvPr id="4" name="Content Placeholder 3"/>
+          <p:cNvPicPr>
+            <a:picLocks noGrp="1" noChangeAspect="1"/>
+          </p:cNvPicPr>
+          <p:nvPr>
+            <p:ph idx="1"/>
+          </p:nvPr>
+        </p:nvPicPr>
+        <p:blipFill>
+          <a:blip r:embed="rId2">
+            <a:extLst>
+              <a:ext uri="{28A0092B-C50C-407E-A947-70E740481C1C}">
+                <a14:useLocalDpi xmlns:a14="http://schemas.microsoft.com/office/drawing/2010/main" val="0"/>
+              </a:ext>
+            </a:extLst>
+          </a:blip>
+          <a:stretch>
+            <a:fillRect/>
+          </a:stretch>
+        </p:blipFill>
+        <p:spPr>
+          <a:xfrm>
+            <a:off x="457202" y="2355759"/>
+            <a:ext cx="6029690" cy="3014845"/>
+          </a:xfrm>
+        </p:spPr>
+      </p:pic>
+      <p:pic>
+        <p:nvPicPr>
+          <p:cNvPr id="5" name="Picture 4"/>
+          <p:cNvPicPr>
+            <a:picLocks noChangeAspect="1"/>
+          </p:cNvPicPr>
+          <p:nvPr/>
+        </p:nvPicPr>
+        <p:blipFill rotWithShape="1">
+          <a:blip r:embed="rId3"/>
+          <a:srcRect b="29593"/>
+          <a:stretch/>
+        </p:blipFill>
+        <p:spPr>
+          <a:xfrm>
+            <a:off x="6589861" y="1417638"/>
+            <a:ext cx="2221814" cy="4828490"/>
+          </a:xfrm>
+          <a:prstGeom prst="rect">
+            <a:avLst/>
+          </a:prstGeom>
+        </p:spPr>
+      </p:pic>
+    </p:spTree>
+    <p:extLst>
+      <p:ext uri="{BB962C8B-B14F-4D97-AF65-F5344CB8AC3E}">
+        <p14:creationId xmlns:p14="http://schemas.microsoft.com/office/powerpoint/2010/main" val="3777482765"/>
+      </p:ext>
+    </p:extLst>
+  </p:cSld>
+  <p:clrMapOvr>
+    <a:masterClrMapping/>
+  </p:clrMapOvr>
+</p:sld>
+</file>
+
+<file path=ppt/slides/slide11.xml><?xml version="1.0" encoding="utf-8"?>
+<p:sld xmlns:a="http://schemas.openxmlformats.org/drawingml/2006/main" xmlns:r="http://schemas.openxmlformats.org/officeDocument/2006/relationships" xmlns:p="http://schemas.openxmlformats.org/presentationml/2006/main">
+  <p:cSld>
+    <p:spTree>
+      <p:nvGrpSpPr>
+        <p:cNvPr id="1" name=""/>
+        <p:cNvGrpSpPr/>
+        <p:nvPr/>
+      </p:nvGrpSpPr>
+      <p:grpSpPr>
+        <a:xfrm>
+          <a:off x="0" y="0"/>
+          <a:ext cx="0" cy="0"/>
+          <a:chOff x="0" y="0"/>
+          <a:chExt cx="0" cy="0"/>
+        </a:xfrm>
+      </p:grpSpPr>
+      <p:sp>
+        <p:nvSpPr>
+          <p:cNvPr id="4" name="Title 3"/>
+          <p:cNvSpPr>
+            <a:spLocks noGrp="1"/>
+          </p:cNvSpPr>
+          <p:nvPr>
+            <p:ph type="ctrTitle"/>
+          </p:nvPr>
+        </p:nvSpPr>
+        <p:spPr>
+          <a:xfrm>
+            <a:off x="685800" y="2702521"/>
+            <a:ext cx="7772400" cy="1470025"/>
+          </a:xfrm>
+        </p:spPr>
+        <p:txBody>
+          <a:bodyPr/>
+          <a:lstStyle/>
+          <a:p>
+            <a:r>
+              <a:rPr lang="en-US" dirty="0" smtClean="0"/>
+              <a:t>Examples of Skew</a:t>
+            </a:r>
+            <a:endParaRPr lang="en-US" dirty="0"/>
+          </a:p>
+        </p:txBody>
+      </p:sp>
+    </p:spTree>
+    <p:extLst>
+      <p:ext uri="{BB962C8B-B14F-4D97-AF65-F5344CB8AC3E}">
+        <p14:creationId xmlns:p14="http://schemas.microsoft.com/office/powerpoint/2010/main" val="2498780834"/>
+      </p:ext>
+    </p:extLst>
+  </p:cSld>
+  <p:clrMapOvr>
+    <a:masterClrMapping/>
+  </p:clrMapOvr>
+</p:sld>
+</file>
+
+<file path=ppt/slides/slide12.xml><?xml version="1.0" encoding="utf-8"?>
+<p:sld xmlns:a="http://schemas.openxmlformats.org/drawingml/2006/main" xmlns:r="http://schemas.openxmlformats.org/officeDocument/2006/relationships" xmlns:p="http://schemas.openxmlformats.org/presentationml/2006/main">
+  <p:cSld>
+    <p:spTree>
+      <p:nvGrpSpPr>
+        <p:cNvPr id="1" name=""/>
+        <p:cNvGrpSpPr/>
+        <p:nvPr/>
+      </p:nvGrpSpPr>
+      <p:grpSpPr>
+        <a:xfrm>
+          <a:off x="0" y="0"/>
+          <a:ext cx="0" cy="0"/>
+          <a:chOff x="0" y="0"/>
+          <a:chExt cx="0" cy="0"/>
+        </a:xfrm>
+      </p:grpSpPr>
+      <p:sp>
+        <p:nvSpPr>
+          <p:cNvPr id="2" name="Title 1"/>
+          <p:cNvSpPr>
+            <a:spLocks noGrp="1"/>
+          </p:cNvSpPr>
+          <p:nvPr>
+            <p:ph type="title"/>
+          </p:nvPr>
+        </p:nvSpPr>
+        <p:spPr/>
+        <p:txBody>
+          <a:bodyPr/>
+          <a:lstStyle/>
+          <a:p>
+            <a:r>
+              <a:rPr lang="en-US" dirty="0" smtClean="0"/>
+              <a:t>Chopin </a:t>
+            </a:r>
+            <a:r>
+              <a:rPr lang="mr-IN" dirty="0" smtClean="0"/>
+              <a:t>–</a:t>
+            </a:r>
+            <a:r>
+              <a:rPr lang="en-US" dirty="0" smtClean="0"/>
+              <a:t> “Prelude #4”</a:t>
+            </a:r>
+            <a:endParaRPr lang="en-US" dirty="0"/>
+          </a:p>
+        </p:txBody>
+      </p:sp>
+      <p:pic>
+        <p:nvPicPr>
+          <p:cNvPr id="4" name="Content Placeholder 3"/>
+          <p:cNvPicPr>
+            <a:picLocks noGrp="1" noChangeAspect="1"/>
+          </p:cNvPicPr>
+          <p:nvPr>
+            <p:ph idx="1"/>
+          </p:nvPr>
+        </p:nvPicPr>
+        <p:blipFill>
+          <a:blip r:embed="rId2">
+            <a:extLst>
+              <a:ext uri="{28A0092B-C50C-407E-A947-70E740481C1C}">
+                <a14:useLocalDpi xmlns:a14="http://schemas.microsoft.com/office/drawing/2010/main" val="0"/>
+              </a:ext>
+            </a:extLst>
+          </a:blip>
+          <a:stretch>
+            <a:fillRect/>
+          </a:stretch>
+        </p:blipFill>
+        <p:spPr>
+          <a:xfrm>
+            <a:off x="457202" y="2355759"/>
+            <a:ext cx="6029690" cy="3014845"/>
+          </a:xfrm>
+        </p:spPr>
+      </p:pic>
+      <p:pic>
+        <p:nvPicPr>
+          <p:cNvPr id="3" name="Picture 2"/>
+          <p:cNvPicPr>
+            <a:picLocks noChangeAspect="1"/>
+          </p:cNvPicPr>
+          <p:nvPr/>
+        </p:nvPicPr>
+        <p:blipFill rotWithShape="1">
+          <a:blip r:embed="rId3"/>
+          <a:srcRect b="29426"/>
+          <a:stretch/>
+        </p:blipFill>
+        <p:spPr>
+          <a:xfrm>
+            <a:off x="6589861" y="1417638"/>
+            <a:ext cx="2221814" cy="4839932"/>
+          </a:xfrm>
+          <a:prstGeom prst="rect">
+            <a:avLst/>
+          </a:prstGeom>
+        </p:spPr>
+      </p:pic>
+    </p:spTree>
+    <p:extLst>
+      <p:ext uri="{BB962C8B-B14F-4D97-AF65-F5344CB8AC3E}">
+        <p14:creationId xmlns:p14="http://schemas.microsoft.com/office/powerpoint/2010/main" val="3265440676"/>
+      </p:ext>
+    </p:extLst>
+  </p:cSld>
+  <p:clrMapOvr>
+    <a:masterClrMapping/>
+  </p:clrMapOvr>
+</p:sld>
+</file>
+
+<file path=ppt/slides/slide13.xml><?xml version="1.0" encoding="utf-8"?>
+<p:sld xmlns:a="http://schemas.openxmlformats.org/drawingml/2006/main" xmlns:r="http://schemas.openxmlformats.org/officeDocument/2006/relationships" xmlns:p="http://schemas.openxmlformats.org/presentationml/2006/main">
+  <p:cSld>
+    <p:spTree>
+      <p:nvGrpSpPr>
+        <p:cNvPr id="1" name=""/>
+        <p:cNvGrpSpPr/>
+        <p:nvPr/>
+      </p:nvGrpSpPr>
+      <p:grpSpPr>
+        <a:xfrm>
+          <a:off x="0" y="0"/>
+          <a:ext cx="0" cy="0"/>
+          <a:chOff x="0" y="0"/>
+          <a:chExt cx="0" cy="0"/>
+        </a:xfrm>
+      </p:grpSpPr>
+      <p:sp>
+        <p:nvSpPr>
+          <p:cNvPr id="2" name="Title 1"/>
+          <p:cNvSpPr>
+            <a:spLocks noGrp="1"/>
+          </p:cNvSpPr>
+          <p:nvPr>
+            <p:ph type="title"/>
+          </p:nvPr>
+        </p:nvSpPr>
+        <p:spPr/>
+        <p:txBody>
+          <a:bodyPr/>
+          <a:lstStyle/>
+          <a:p>
+            <a:r>
+              <a:rPr lang="en-US" dirty="0" err="1" smtClean="0"/>
+              <a:t>Ryoji</a:t>
+            </a:r>
+            <a:r>
+              <a:rPr lang="en-US" dirty="0" smtClean="0"/>
+              <a:t> Ikeda </a:t>
+            </a:r>
+            <a:r>
+              <a:rPr lang="mr-IN" dirty="0" smtClean="0"/>
+              <a:t>–</a:t>
+            </a:r>
+            <a:r>
+              <a:rPr lang="en-US" dirty="0" smtClean="0"/>
+              <a:t> “</a:t>
+            </a:r>
+            <a:r>
+              <a:rPr lang="en-US" dirty="0" err="1" smtClean="0"/>
+              <a:t>data.convex</a:t>
+            </a:r>
+            <a:r>
+              <a:rPr lang="en-US" dirty="0" smtClean="0"/>
+              <a:t>”</a:t>
+            </a:r>
+            <a:endParaRPr lang="en-US" dirty="0"/>
+          </a:p>
+        </p:txBody>
+      </p:sp>
+      <p:pic>
+        <p:nvPicPr>
+          <p:cNvPr id="4" name="Content Placeholder 3"/>
+          <p:cNvPicPr>
+            <a:picLocks noGrp="1" noChangeAspect="1"/>
+          </p:cNvPicPr>
+          <p:nvPr>
+            <p:ph idx="1"/>
+          </p:nvPr>
+        </p:nvPicPr>
+        <p:blipFill>
+          <a:blip r:embed="rId2">
+            <a:extLst>
+              <a:ext uri="{28A0092B-C50C-407E-A947-70E740481C1C}">
+                <a14:useLocalDpi xmlns:a14="http://schemas.microsoft.com/office/drawing/2010/main" val="0"/>
+              </a:ext>
+            </a:extLst>
+          </a:blip>
+          <a:stretch>
+            <a:fillRect/>
+          </a:stretch>
+        </p:blipFill>
+        <p:spPr>
+          <a:xfrm>
+            <a:off x="457202" y="2355759"/>
+            <a:ext cx="6029690" cy="3014845"/>
+          </a:xfrm>
+        </p:spPr>
+      </p:pic>
+      <p:pic>
+        <p:nvPicPr>
+          <p:cNvPr id="5" name="Picture 4"/>
+          <p:cNvPicPr>
+            <a:picLocks noChangeAspect="1"/>
+          </p:cNvPicPr>
+          <p:nvPr/>
+        </p:nvPicPr>
+        <p:blipFill rotWithShape="1">
+          <a:blip r:embed="rId3"/>
+          <a:srcRect b="29426"/>
+          <a:stretch/>
+        </p:blipFill>
+        <p:spPr>
+          <a:xfrm>
+            <a:off x="6589861" y="1417638"/>
+            <a:ext cx="2221814" cy="4839932"/>
+          </a:xfrm>
+          <a:prstGeom prst="rect">
+            <a:avLst/>
+          </a:prstGeom>
+        </p:spPr>
+      </p:pic>
+    </p:spTree>
+    <p:extLst>
+      <p:ext uri="{BB962C8B-B14F-4D97-AF65-F5344CB8AC3E}">
+        <p14:creationId xmlns:p14="http://schemas.microsoft.com/office/powerpoint/2010/main" val="578780899"/>
+      </p:ext>
+    </p:extLst>
+  </p:cSld>
+  <p:clrMapOvr>
+    <a:masterClrMapping/>
+  </p:clrMapOvr>
+</p:sld>
+</file>
+
+<file path=ppt/slides/slide14.xml><?xml version="1.0" encoding="utf-8"?>
+<p:sld xmlns:a="http://schemas.openxmlformats.org/drawingml/2006/main" xmlns:r="http://schemas.openxmlformats.org/officeDocument/2006/relationships" xmlns:p="http://schemas.openxmlformats.org/presentationml/2006/main">
+  <p:cSld>
+    <p:spTree>
+      <p:nvGrpSpPr>
+        <p:cNvPr id="1" name=""/>
+        <p:cNvGrpSpPr/>
+        <p:nvPr/>
+      </p:nvGrpSpPr>
+      <p:grpSpPr>
+        <a:xfrm>
+          <a:off x="0" y="0"/>
+          <a:ext cx="0" cy="0"/>
+          <a:chOff x="0" y="0"/>
+          <a:chExt cx="0" cy="0"/>
+        </a:xfrm>
+      </p:grpSpPr>
+      <p:sp>
+        <p:nvSpPr>
+          <p:cNvPr id="4" name="Title 3"/>
+          <p:cNvSpPr>
+            <a:spLocks noGrp="1"/>
+          </p:cNvSpPr>
+          <p:nvPr>
+            <p:ph type="ctrTitle"/>
+          </p:nvPr>
+        </p:nvSpPr>
+        <p:spPr>
+          <a:xfrm>
+            <a:off x="685800" y="2702521"/>
+            <a:ext cx="7772400" cy="1470025"/>
+          </a:xfrm>
+        </p:spPr>
+        <p:txBody>
+          <a:bodyPr/>
+          <a:lstStyle/>
+          <a:p>
+            <a:r>
+              <a:rPr lang="en-US" dirty="0" smtClean="0"/>
+              <a:t>Tests</a:t>
+            </a:r>
+            <a:endParaRPr lang="en-US" dirty="0"/>
+          </a:p>
+        </p:txBody>
+      </p:sp>
+    </p:spTree>
+    <p:extLst>
+      <p:ext uri="{BB962C8B-B14F-4D97-AF65-F5344CB8AC3E}">
+        <p14:creationId xmlns:p14="http://schemas.microsoft.com/office/powerpoint/2010/main" val="2224528631"/>
+      </p:ext>
+    </p:extLst>
+  </p:cSld>
+  <p:clrMapOvr>
+    <a:masterClrMapping/>
+  </p:clrMapOvr>
+</p:sld>
+</file>
+
+<file path=ppt/slides/slide15.xml><?xml version="1.0" encoding="utf-8"?>
+<p:sld xmlns:a="http://schemas.openxmlformats.org/drawingml/2006/main" xmlns:r="http://schemas.openxmlformats.org/officeDocument/2006/relationships" xmlns:p="http://schemas.openxmlformats.org/presentationml/2006/main">
+  <p:cSld>
+    <p:spTree>
+      <p:nvGrpSpPr>
+        <p:cNvPr id="1" name=""/>
+        <p:cNvGrpSpPr/>
+        <p:nvPr/>
+      </p:nvGrpSpPr>
+      <p:grpSpPr>
+        <a:xfrm>
+          <a:off x="0" y="0"/>
+          <a:ext cx="0" cy="0"/>
+          <a:chOff x="0" y="0"/>
+          <a:chExt cx="0" cy="0"/>
+        </a:xfrm>
+      </p:grpSpPr>
+      <p:sp>
+        <p:nvSpPr>
+          <p:cNvPr id="2" name="Title 1"/>
+          <p:cNvSpPr>
+            <a:spLocks noGrp="1"/>
+          </p:cNvSpPr>
+          <p:nvPr>
+            <p:ph type="title"/>
+          </p:nvPr>
+        </p:nvSpPr>
+        <p:spPr/>
+        <p:txBody>
+          <a:bodyPr/>
+          <a:lstStyle/>
+          <a:p>
+            <a:r>
+              <a:rPr lang="en-US" dirty="0" smtClean="0"/>
+              <a:t>White Noise</a:t>
+            </a:r>
+            <a:endParaRPr lang="en-US" dirty="0"/>
+          </a:p>
+        </p:txBody>
+      </p:sp>
+      <p:pic>
+        <p:nvPicPr>
+          <p:cNvPr id="4" name="Content Placeholder 3" descr="whitenoise_hist.png"/>
+          <p:cNvPicPr>
+            <a:picLocks noGrp="1" noChangeAspect="1"/>
+          </p:cNvPicPr>
+          <p:nvPr>
+            <p:ph idx="1"/>
+          </p:nvPr>
+        </p:nvPicPr>
+        <p:blipFill>
+          <a:blip r:embed="rId2">
+            <a:extLst>
+              <a:ext uri="{28A0092B-C50C-407E-A947-70E740481C1C}">
+                <a14:useLocalDpi xmlns:a14="http://schemas.microsoft.com/office/drawing/2010/main" val="0"/>
+              </a:ext>
+            </a:extLst>
+          </a:blip>
+          <a:srcRect t="-4996" b="-4996"/>
+          <a:stretch>
+            <a:fillRect/>
+          </a:stretch>
+        </p:blipFill>
+        <p:spPr>
+          <a:xfrm>
+            <a:off x="457202" y="1600200"/>
+            <a:ext cx="6029690" cy="4525963"/>
+          </a:xfrm>
+        </p:spPr>
+      </p:pic>
+      <p:pic>
+        <p:nvPicPr>
+          <p:cNvPr id="5" name="Picture 4"/>
+          <p:cNvPicPr>
+            <a:picLocks noChangeAspect="1"/>
+          </p:cNvPicPr>
+          <p:nvPr/>
+        </p:nvPicPr>
+        <p:blipFill rotWithShape="1">
+          <a:blip r:embed="rId3"/>
+          <a:srcRect b="29426"/>
+          <a:stretch/>
+        </p:blipFill>
+        <p:spPr>
+          <a:xfrm>
+            <a:off x="6589861" y="1417638"/>
+            <a:ext cx="2221814" cy="4839932"/>
+          </a:xfrm>
+          <a:prstGeom prst="rect">
+            <a:avLst/>
+          </a:prstGeom>
+        </p:spPr>
+      </p:pic>
+    </p:spTree>
+    <p:extLst>
+      <p:ext uri="{BB962C8B-B14F-4D97-AF65-F5344CB8AC3E}">
+        <p14:creationId xmlns:p14="http://schemas.microsoft.com/office/powerpoint/2010/main" val="1351318650"/>
+      </p:ext>
+    </p:extLst>
+  </p:cSld>
+  <p:clrMapOvr>
+    <a:masterClrMapping/>
+  </p:clrMapOvr>
+</p:sld>
+</file>
+
+<file path=ppt/slides/slide16.xml><?xml version="1.0" encoding="utf-8"?>
+<p:sld xmlns:a="http://schemas.openxmlformats.org/drawingml/2006/main" xmlns:r="http://schemas.openxmlformats.org/officeDocument/2006/relationships" xmlns:p="http://schemas.openxmlformats.org/presentationml/2006/main">
+  <p:cSld>
+    <p:spTree>
+      <p:nvGrpSpPr>
+        <p:cNvPr id="1" name=""/>
+        <p:cNvGrpSpPr/>
+        <p:nvPr/>
+      </p:nvGrpSpPr>
+      <p:grpSpPr>
+        <a:xfrm>
+          <a:off x="0" y="0"/>
+          <a:ext cx="0" cy="0"/>
+          <a:chOff x="0" y="0"/>
+          <a:chExt cx="0" cy="0"/>
+        </a:xfrm>
+      </p:grpSpPr>
+      <p:sp>
+        <p:nvSpPr>
+          <p:cNvPr id="2" name="Title 1"/>
+          <p:cNvSpPr>
+            <a:spLocks noGrp="1"/>
+          </p:cNvSpPr>
+          <p:nvPr>
+            <p:ph type="title"/>
+          </p:nvPr>
+        </p:nvSpPr>
+        <p:spPr/>
+        <p:txBody>
           <a:bodyPr>
             <a:normAutofit fontScale="90000"/>
           </a:bodyPr>
@@ -3353,7 +3932,7 @@
 </p:sld>
 </file>
 
-<file path=ppt/slides/slide11.xml><?xml version="1.0" encoding="utf-8"?>
+<file path=ppt/slides/slide17.xml><?xml version="1.0" encoding="utf-8"?>
 <p:sld xmlns:a="http://schemas.openxmlformats.org/drawingml/2006/main" xmlns:r="http://schemas.openxmlformats.org/officeDocument/2006/relationships" xmlns:p="http://schemas.openxmlformats.org/presentationml/2006/main">
   <p:cSld>
     <p:spTree>
@@ -3558,6 +4137,459 @@
           <a:p>
             <a:r>
               <a:rPr lang="en-US" dirty="0" smtClean="0"/>
+              <a:t>Code Excerpts</a:t>
+            </a:r>
+            <a:endParaRPr lang="en-US" dirty="0"/>
+          </a:p>
+        </p:txBody>
+      </p:sp>
+    </p:spTree>
+    <p:extLst>
+      <p:ext uri="{BB962C8B-B14F-4D97-AF65-F5344CB8AC3E}">
+        <p14:creationId xmlns:p14="http://schemas.microsoft.com/office/powerpoint/2010/main" val="1266434844"/>
+      </p:ext>
+    </p:extLst>
+  </p:cSld>
+  <p:clrMapOvr>
+    <a:masterClrMapping/>
+  </p:clrMapOvr>
+</p:sld>
+</file>
+
+<file path=ppt/slides/slide3.xml><?xml version="1.0" encoding="utf-8"?>
+<p:sld xmlns:a="http://schemas.openxmlformats.org/drawingml/2006/main" xmlns:r="http://schemas.openxmlformats.org/officeDocument/2006/relationships" xmlns:p="http://schemas.openxmlformats.org/presentationml/2006/main">
+  <p:cSld>
+    <p:spTree>
+      <p:nvGrpSpPr>
+        <p:cNvPr id="1" name=""/>
+        <p:cNvGrpSpPr/>
+        <p:nvPr/>
+      </p:nvGrpSpPr>
+      <p:grpSpPr>
+        <a:xfrm>
+          <a:off x="0" y="0"/>
+          <a:ext cx="0" cy="0"/>
+          <a:chOff x="0" y="0"/>
+          <a:chExt cx="0" cy="0"/>
+        </a:xfrm>
+      </p:grpSpPr>
+      <p:sp>
+        <p:nvSpPr>
+          <p:cNvPr id="2" name="Title 1"/>
+          <p:cNvSpPr>
+            <a:spLocks noGrp="1"/>
+          </p:cNvSpPr>
+          <p:nvPr>
+            <p:ph type="title"/>
+          </p:nvPr>
+        </p:nvSpPr>
+        <p:spPr/>
+        <p:txBody>
+          <a:bodyPr/>
+          <a:lstStyle/>
+          <a:p>
+            <a:r>
+              <a:rPr lang="en-US" dirty="0" smtClean="0"/>
+              <a:t>Audio Processing</a:t>
+            </a:r>
+            <a:endParaRPr lang="en-US" dirty="0"/>
+          </a:p>
+        </p:txBody>
+      </p:sp>
+      <p:pic>
+        <p:nvPicPr>
+          <p:cNvPr id="8" name="Picture 7"/>
+          <p:cNvPicPr>
+            <a:picLocks noChangeAspect="1"/>
+          </p:cNvPicPr>
+          <p:nvPr/>
+        </p:nvPicPr>
+        <p:blipFill>
+          <a:blip r:embed="rId2"/>
+          <a:stretch>
+            <a:fillRect/>
+          </a:stretch>
+        </p:blipFill>
+        <p:spPr>
+          <a:xfrm>
+            <a:off x="4766270" y="1968010"/>
+            <a:ext cx="4253785" cy="3927709"/>
+          </a:xfrm>
+          <a:prstGeom prst="rect">
+            <a:avLst/>
+          </a:prstGeom>
+        </p:spPr>
+      </p:pic>
+      <p:pic>
+        <p:nvPicPr>
+          <p:cNvPr id="9" name="Picture 8"/>
+          <p:cNvPicPr>
+            <a:picLocks noChangeAspect="1"/>
+          </p:cNvPicPr>
+          <p:nvPr/>
+        </p:nvPicPr>
+        <p:blipFill rotWithShape="1">
+          <a:blip r:embed="rId3"/>
+          <a:srcRect b="56104"/>
+          <a:stretch/>
+        </p:blipFill>
+        <p:spPr>
+          <a:xfrm>
+            <a:off x="171610" y="2149922"/>
+            <a:ext cx="4594659" cy="3010385"/>
+          </a:xfrm>
+          <a:prstGeom prst="rect">
+            <a:avLst/>
+          </a:prstGeom>
+        </p:spPr>
+      </p:pic>
+    </p:spTree>
+    <p:extLst>
+      <p:ext uri="{BB962C8B-B14F-4D97-AF65-F5344CB8AC3E}">
+        <p14:creationId xmlns:p14="http://schemas.microsoft.com/office/powerpoint/2010/main" val="521619817"/>
+      </p:ext>
+    </p:extLst>
+  </p:cSld>
+  <p:clrMapOvr>
+    <a:masterClrMapping/>
+  </p:clrMapOvr>
+  <p:timing>
+    <p:tnLst>
+      <p:par>
+        <p:cTn xmlns:p14="http://schemas.microsoft.com/office/powerpoint/2010/main" id="1" dur="indefinite" restart="never" nodeType="tmRoot"/>
+      </p:par>
+    </p:tnLst>
+  </p:timing>
+</p:sld>
+</file>
+
+<file path=ppt/slides/slide4.xml><?xml version="1.0" encoding="utf-8"?>
+<p:sld xmlns:a="http://schemas.openxmlformats.org/drawingml/2006/main" xmlns:r="http://schemas.openxmlformats.org/officeDocument/2006/relationships" xmlns:p="http://schemas.openxmlformats.org/presentationml/2006/main">
+  <p:cSld>
+    <p:spTree>
+      <p:nvGrpSpPr>
+        <p:cNvPr id="1" name=""/>
+        <p:cNvGrpSpPr/>
+        <p:nvPr/>
+      </p:nvGrpSpPr>
+      <p:grpSpPr>
+        <a:xfrm>
+          <a:off x="0" y="0"/>
+          <a:ext cx="0" cy="0"/>
+          <a:chOff x="0" y="0"/>
+          <a:chExt cx="0" cy="0"/>
+        </a:xfrm>
+      </p:grpSpPr>
+      <p:sp>
+        <p:nvSpPr>
+          <p:cNvPr id="2" name="Title 1"/>
+          <p:cNvSpPr>
+            <a:spLocks noGrp="1"/>
+          </p:cNvSpPr>
+          <p:nvPr>
+            <p:ph type="title"/>
+          </p:nvPr>
+        </p:nvSpPr>
+        <p:spPr/>
+        <p:txBody>
+          <a:bodyPr/>
+          <a:lstStyle/>
+          <a:p>
+            <a:r>
+              <a:rPr lang="en-US" dirty="0" smtClean="0"/>
+              <a:t>Choose Random Bin</a:t>
+            </a:r>
+            <a:endParaRPr lang="en-US" dirty="0"/>
+          </a:p>
+        </p:txBody>
+      </p:sp>
+      <p:pic>
+        <p:nvPicPr>
+          <p:cNvPr id="4" name="Content Placeholder 3"/>
+          <p:cNvPicPr>
+            <a:picLocks noGrp="1" noChangeAspect="1"/>
+          </p:cNvPicPr>
+          <p:nvPr>
+            <p:ph idx="1"/>
+          </p:nvPr>
+        </p:nvPicPr>
+        <p:blipFill>
+          <a:blip r:embed="rId2"/>
+          <a:srcRect l="-7499" r="-7499"/>
+          <a:stretch>
+            <a:fillRect/>
+          </a:stretch>
+        </p:blipFill>
+        <p:spPr/>
+      </p:pic>
+    </p:spTree>
+    <p:extLst>
+      <p:ext uri="{BB962C8B-B14F-4D97-AF65-F5344CB8AC3E}">
+        <p14:creationId xmlns:p14="http://schemas.microsoft.com/office/powerpoint/2010/main" val="831967929"/>
+      </p:ext>
+    </p:extLst>
+  </p:cSld>
+  <p:clrMapOvr>
+    <a:masterClrMapping/>
+  </p:clrMapOvr>
+</p:sld>
+</file>
+
+<file path=ppt/slides/slide5.xml><?xml version="1.0" encoding="utf-8"?>
+<p:sld xmlns:a="http://schemas.openxmlformats.org/drawingml/2006/main" xmlns:r="http://schemas.openxmlformats.org/officeDocument/2006/relationships" xmlns:p="http://schemas.openxmlformats.org/presentationml/2006/main">
+  <p:cSld>
+    <p:spTree>
+      <p:nvGrpSpPr>
+        <p:cNvPr id="1" name=""/>
+        <p:cNvGrpSpPr/>
+        <p:nvPr/>
+      </p:nvGrpSpPr>
+      <p:grpSpPr>
+        <a:xfrm>
+          <a:off x="0" y="0"/>
+          <a:ext cx="0" cy="0"/>
+          <a:chOff x="0" y="0"/>
+          <a:chExt cx="0" cy="0"/>
+        </a:xfrm>
+      </p:grpSpPr>
+      <p:sp>
+        <p:nvSpPr>
+          <p:cNvPr id="2" name="Title 1"/>
+          <p:cNvSpPr>
+            <a:spLocks noGrp="1"/>
+          </p:cNvSpPr>
+          <p:nvPr>
+            <p:ph type="title"/>
+          </p:nvPr>
+        </p:nvSpPr>
+        <p:spPr/>
+        <p:txBody>
+          <a:bodyPr/>
+          <a:lstStyle/>
+          <a:p>
+            <a:r>
+              <a:rPr lang="en-US" dirty="0" smtClean="0"/>
+              <a:t>Animation</a:t>
+            </a:r>
+            <a:endParaRPr lang="en-US" dirty="0"/>
+          </a:p>
+        </p:txBody>
+      </p:sp>
+      <p:pic>
+        <p:nvPicPr>
+          <p:cNvPr id="4" name="Content Placeholder 3"/>
+          <p:cNvPicPr>
+            <a:picLocks noGrp="1" noChangeAspect="1"/>
+          </p:cNvPicPr>
+          <p:nvPr>
+            <p:ph idx="1"/>
+          </p:nvPr>
+        </p:nvPicPr>
+        <p:blipFill>
+          <a:blip r:embed="rId2"/>
+          <a:srcRect l="-64313" r="-64313"/>
+          <a:stretch>
+            <a:fillRect/>
+          </a:stretch>
+        </p:blipFill>
+        <p:spPr/>
+      </p:pic>
+    </p:spTree>
+    <p:extLst>
+      <p:ext uri="{BB962C8B-B14F-4D97-AF65-F5344CB8AC3E}">
+        <p14:creationId xmlns:p14="http://schemas.microsoft.com/office/powerpoint/2010/main" val="2753684437"/>
+      </p:ext>
+    </p:extLst>
+  </p:cSld>
+  <p:clrMapOvr>
+    <a:masterClrMapping/>
+  </p:clrMapOvr>
+</p:sld>
+</file>
+
+<file path=ppt/slides/slide6.xml><?xml version="1.0" encoding="utf-8"?>
+<p:sld xmlns:a="http://schemas.openxmlformats.org/drawingml/2006/main" xmlns:r="http://schemas.openxmlformats.org/officeDocument/2006/relationships" xmlns:p="http://schemas.openxmlformats.org/presentationml/2006/main">
+  <p:cSld>
+    <p:spTree>
+      <p:nvGrpSpPr>
+        <p:cNvPr id="1" name=""/>
+        <p:cNvGrpSpPr/>
+        <p:nvPr/>
+      </p:nvGrpSpPr>
+      <p:grpSpPr>
+        <a:xfrm>
+          <a:off x="0" y="0"/>
+          <a:ext cx="0" cy="0"/>
+          <a:chOff x="0" y="0"/>
+          <a:chExt cx="0" cy="0"/>
+        </a:xfrm>
+      </p:grpSpPr>
+      <p:sp>
+        <p:nvSpPr>
+          <p:cNvPr id="2" name="Title 1"/>
+          <p:cNvSpPr>
+            <a:spLocks noGrp="1"/>
+          </p:cNvSpPr>
+          <p:nvPr>
+            <p:ph type="title"/>
+          </p:nvPr>
+        </p:nvSpPr>
+        <p:spPr/>
+        <p:txBody>
+          <a:bodyPr/>
+          <a:lstStyle/>
+          <a:p>
+            <a:r>
+              <a:rPr lang="en-US" dirty="0" smtClean="0"/>
+              <a:t>Collisions</a:t>
+            </a:r>
+            <a:endParaRPr lang="en-US" dirty="0"/>
+          </a:p>
+        </p:txBody>
+      </p:sp>
+      <p:pic>
+        <p:nvPicPr>
+          <p:cNvPr id="4" name="Content Placeholder 3"/>
+          <p:cNvPicPr>
+            <a:picLocks noGrp="1" noChangeAspect="1"/>
+          </p:cNvPicPr>
+          <p:nvPr>
+            <p:ph idx="1"/>
+          </p:nvPr>
+        </p:nvPicPr>
+        <p:blipFill>
+          <a:blip r:embed="rId2"/>
+          <a:srcRect t="-557" b="-557"/>
+          <a:stretch>
+            <a:fillRect/>
+          </a:stretch>
+        </p:blipFill>
+        <p:spPr/>
+      </p:pic>
+    </p:spTree>
+    <p:extLst>
+      <p:ext uri="{BB962C8B-B14F-4D97-AF65-F5344CB8AC3E}">
+        <p14:creationId xmlns:p14="http://schemas.microsoft.com/office/powerpoint/2010/main" val="3735704264"/>
+      </p:ext>
+    </p:extLst>
+  </p:cSld>
+  <p:clrMapOvr>
+    <a:masterClrMapping/>
+  </p:clrMapOvr>
+</p:sld>
+</file>
+
+<file path=ppt/slides/slide7.xml><?xml version="1.0" encoding="utf-8"?>
+<p:sld xmlns:a="http://schemas.openxmlformats.org/drawingml/2006/main" xmlns:r="http://schemas.openxmlformats.org/officeDocument/2006/relationships" xmlns:p="http://schemas.openxmlformats.org/presentationml/2006/main">
+  <p:cSld>
+    <p:spTree>
+      <p:nvGrpSpPr>
+        <p:cNvPr id="1" name=""/>
+        <p:cNvGrpSpPr/>
+        <p:nvPr/>
+      </p:nvGrpSpPr>
+      <p:grpSpPr>
+        <a:xfrm>
+          <a:off x="0" y="0"/>
+          <a:ext cx="0" cy="0"/>
+          <a:chOff x="0" y="0"/>
+          <a:chExt cx="0" cy="0"/>
+        </a:xfrm>
+      </p:grpSpPr>
+      <p:sp>
+        <p:nvSpPr>
+          <p:cNvPr id="2" name="Title 1"/>
+          <p:cNvSpPr>
+            <a:spLocks noGrp="1"/>
+          </p:cNvSpPr>
+          <p:nvPr>
+            <p:ph type="title"/>
+          </p:nvPr>
+        </p:nvSpPr>
+        <p:spPr/>
+        <p:txBody>
+          <a:bodyPr/>
+          <a:lstStyle/>
+          <a:p>
+            <a:r>
+              <a:rPr lang="en-US" dirty="0" smtClean="0"/>
+              <a:t>Vibration Reduction</a:t>
+            </a:r>
+            <a:endParaRPr lang="en-US" dirty="0"/>
+          </a:p>
+        </p:txBody>
+      </p:sp>
+      <p:pic>
+        <p:nvPicPr>
+          <p:cNvPr id="4" name="Content Placeholder 3"/>
+          <p:cNvPicPr>
+            <a:picLocks noGrp="1" noChangeAspect="1"/>
+          </p:cNvPicPr>
+          <p:nvPr>
+            <p:ph idx="1"/>
+          </p:nvPr>
+        </p:nvPicPr>
+        <p:blipFill>
+          <a:blip r:embed="rId2"/>
+          <a:srcRect t="-55790" b="-55790"/>
+          <a:stretch>
+            <a:fillRect/>
+          </a:stretch>
+        </p:blipFill>
+        <p:spPr/>
+      </p:pic>
+    </p:spTree>
+    <p:extLst>
+      <p:ext uri="{BB962C8B-B14F-4D97-AF65-F5344CB8AC3E}">
+        <p14:creationId xmlns:p14="http://schemas.microsoft.com/office/powerpoint/2010/main" val="39527297"/>
+      </p:ext>
+    </p:extLst>
+  </p:cSld>
+  <p:clrMapOvr>
+    <a:masterClrMapping/>
+  </p:clrMapOvr>
+</p:sld>
+</file>
+
+<file path=ppt/slides/slide8.xml><?xml version="1.0" encoding="utf-8"?>
+<p:sld xmlns:a="http://schemas.openxmlformats.org/drawingml/2006/main" xmlns:r="http://schemas.openxmlformats.org/officeDocument/2006/relationships" xmlns:p="http://schemas.openxmlformats.org/presentationml/2006/main">
+  <p:cSld>
+    <p:spTree>
+      <p:nvGrpSpPr>
+        <p:cNvPr id="1" name=""/>
+        <p:cNvGrpSpPr/>
+        <p:nvPr/>
+      </p:nvGrpSpPr>
+      <p:grpSpPr>
+        <a:xfrm>
+          <a:off x="0" y="0"/>
+          <a:ext cx="0" cy="0"/>
+          <a:chOff x="0" y="0"/>
+          <a:chExt cx="0" cy="0"/>
+        </a:xfrm>
+      </p:grpSpPr>
+      <p:sp>
+        <p:nvSpPr>
+          <p:cNvPr id="4" name="Title 3"/>
+          <p:cNvSpPr>
+            <a:spLocks noGrp="1"/>
+          </p:cNvSpPr>
+          <p:nvPr>
+            <p:ph type="ctrTitle"/>
+          </p:nvPr>
+        </p:nvSpPr>
+        <p:spPr>
+          <a:xfrm>
+            <a:off x="685800" y="2702521"/>
+            <a:ext cx="7772400" cy="1470025"/>
+          </a:xfrm>
+        </p:spPr>
+        <p:txBody>
+          <a:bodyPr/>
+          <a:lstStyle/>
+          <a:p>
+            <a:r>
+              <a:rPr lang="en-US" dirty="0" smtClean="0"/>
               <a:t>Basic Examples</a:t>
             </a:r>
             <a:endParaRPr lang="en-US" dirty="0"/>
@@ -3577,7 +4609,7 @@
 </p:sld>
 </file>
 
-<file path=ppt/slides/slide3.xml><?xml version="1.0" encoding="utf-8"?>
+<file path=ppt/slides/slide9.xml><?xml version="1.0" encoding="utf-8"?>
 <p:sld xmlns:a="http://schemas.openxmlformats.org/drawingml/2006/main" xmlns:r="http://schemas.openxmlformats.org/officeDocument/2006/relationships" xmlns:p="http://schemas.openxmlformats.org/presentationml/2006/main">
   <p:cSld>
     <p:spTree>
@@ -3685,579 +4717,6 @@
     <p:extLst>
       <p:ext uri="{BB962C8B-B14F-4D97-AF65-F5344CB8AC3E}">
         <p14:creationId xmlns:p14="http://schemas.microsoft.com/office/powerpoint/2010/main" val="3777482765"/>
-      </p:ext>
-    </p:extLst>
-  </p:cSld>
-  <p:clrMapOvr>
-    <a:masterClrMapping/>
-  </p:clrMapOvr>
-</p:sld>
-</file>
-
-<file path=ppt/slides/slide4.xml><?xml version="1.0" encoding="utf-8"?>
-<p:sld xmlns:a="http://schemas.openxmlformats.org/drawingml/2006/main" xmlns:r="http://schemas.openxmlformats.org/officeDocument/2006/relationships" xmlns:p="http://schemas.openxmlformats.org/presentationml/2006/main">
-  <p:cSld>
-    <p:spTree>
-      <p:nvGrpSpPr>
-        <p:cNvPr id="1" name=""/>
-        <p:cNvGrpSpPr/>
-        <p:nvPr/>
-      </p:nvGrpSpPr>
-      <p:grpSpPr>
-        <a:xfrm>
-          <a:off x="0" y="0"/>
-          <a:ext cx="0" cy="0"/>
-          <a:chOff x="0" y="0"/>
-          <a:chExt cx="0" cy="0"/>
-        </a:xfrm>
-      </p:grpSpPr>
-      <p:sp>
-        <p:nvSpPr>
-          <p:cNvPr id="2" name="Title 1"/>
-          <p:cNvSpPr>
-            <a:spLocks noGrp="1"/>
-          </p:cNvSpPr>
-          <p:nvPr>
-            <p:ph type="title"/>
-          </p:nvPr>
-        </p:nvSpPr>
-        <p:spPr/>
-        <p:txBody>
-          <a:bodyPr/>
-          <a:lstStyle/>
-          <a:p>
-            <a:r>
-              <a:rPr lang="en-US" dirty="0" smtClean="0"/>
-              <a:t>Lido </a:t>
-            </a:r>
-            <a:r>
-              <a:rPr lang="mr-IN" dirty="0" smtClean="0"/>
-              <a:t>–</a:t>
-            </a:r>
-            <a:r>
-              <a:rPr lang="en-US" dirty="0" smtClean="0"/>
-              <a:t> “Citi Bike”</a:t>
-            </a:r>
-            <a:endParaRPr lang="en-US" dirty="0"/>
-          </a:p>
-        </p:txBody>
-      </p:sp>
-      <p:pic>
-        <p:nvPicPr>
-          <p:cNvPr id="4" name="Content Placeholder 3"/>
-          <p:cNvPicPr>
-            <a:picLocks noGrp="1" noChangeAspect="1"/>
-          </p:cNvPicPr>
-          <p:nvPr>
-            <p:ph idx="1"/>
-          </p:nvPr>
-        </p:nvPicPr>
-        <p:blipFill>
-          <a:blip r:embed="rId2">
-            <a:extLst>
-              <a:ext uri="{28A0092B-C50C-407E-A947-70E740481C1C}">
-                <a14:useLocalDpi xmlns:a14="http://schemas.microsoft.com/office/drawing/2010/main" val="0"/>
-              </a:ext>
-            </a:extLst>
-          </a:blip>
-          <a:stretch>
-            <a:fillRect/>
-          </a:stretch>
-        </p:blipFill>
-        <p:spPr>
-          <a:xfrm>
-            <a:off x="457202" y="2355759"/>
-            <a:ext cx="6029690" cy="3014845"/>
-          </a:xfrm>
-        </p:spPr>
-      </p:pic>
-      <p:pic>
-        <p:nvPicPr>
-          <p:cNvPr id="5" name="Picture 4"/>
-          <p:cNvPicPr>
-            <a:picLocks noChangeAspect="1"/>
-          </p:cNvPicPr>
-          <p:nvPr/>
-        </p:nvPicPr>
-        <p:blipFill rotWithShape="1">
-          <a:blip r:embed="rId3"/>
-          <a:srcRect b="29593"/>
-          <a:stretch/>
-        </p:blipFill>
-        <p:spPr>
-          <a:xfrm>
-            <a:off x="6589861" y="1417638"/>
-            <a:ext cx="2221814" cy="4828490"/>
-          </a:xfrm>
-          <a:prstGeom prst="rect">
-            <a:avLst/>
-          </a:prstGeom>
-        </p:spPr>
-      </p:pic>
-    </p:spTree>
-    <p:extLst>
-      <p:ext uri="{BB962C8B-B14F-4D97-AF65-F5344CB8AC3E}">
-        <p14:creationId xmlns:p14="http://schemas.microsoft.com/office/powerpoint/2010/main" val="3777482765"/>
-      </p:ext>
-    </p:extLst>
-  </p:cSld>
-  <p:clrMapOvr>
-    <a:masterClrMapping/>
-  </p:clrMapOvr>
-</p:sld>
-</file>
-
-<file path=ppt/slides/slide5.xml><?xml version="1.0" encoding="utf-8"?>
-<p:sld xmlns:a="http://schemas.openxmlformats.org/drawingml/2006/main" xmlns:r="http://schemas.openxmlformats.org/officeDocument/2006/relationships" xmlns:p="http://schemas.openxmlformats.org/presentationml/2006/main">
-  <p:cSld>
-    <p:spTree>
-      <p:nvGrpSpPr>
-        <p:cNvPr id="1" name=""/>
-        <p:cNvGrpSpPr/>
-        <p:nvPr/>
-      </p:nvGrpSpPr>
-      <p:grpSpPr>
-        <a:xfrm>
-          <a:off x="0" y="0"/>
-          <a:ext cx="0" cy="0"/>
-          <a:chOff x="0" y="0"/>
-          <a:chExt cx="0" cy="0"/>
-        </a:xfrm>
-      </p:grpSpPr>
-      <p:sp>
-        <p:nvSpPr>
-          <p:cNvPr id="4" name="Title 3"/>
-          <p:cNvSpPr>
-            <a:spLocks noGrp="1"/>
-          </p:cNvSpPr>
-          <p:nvPr>
-            <p:ph type="ctrTitle"/>
-          </p:nvPr>
-        </p:nvSpPr>
-        <p:spPr>
-          <a:xfrm>
-            <a:off x="685800" y="2702521"/>
-            <a:ext cx="7772400" cy="1470025"/>
-          </a:xfrm>
-        </p:spPr>
-        <p:txBody>
-          <a:bodyPr/>
-          <a:lstStyle/>
-          <a:p>
-            <a:r>
-              <a:rPr lang="en-US" dirty="0" smtClean="0"/>
-              <a:t>Examples of Skew</a:t>
-            </a:r>
-            <a:endParaRPr lang="en-US" dirty="0"/>
-          </a:p>
-        </p:txBody>
-      </p:sp>
-    </p:spTree>
-    <p:extLst>
-      <p:ext uri="{BB962C8B-B14F-4D97-AF65-F5344CB8AC3E}">
-        <p14:creationId xmlns:p14="http://schemas.microsoft.com/office/powerpoint/2010/main" val="2498780834"/>
-      </p:ext>
-    </p:extLst>
-  </p:cSld>
-  <p:clrMapOvr>
-    <a:masterClrMapping/>
-  </p:clrMapOvr>
-</p:sld>
-</file>
-
-<file path=ppt/slides/slide6.xml><?xml version="1.0" encoding="utf-8"?>
-<p:sld xmlns:a="http://schemas.openxmlformats.org/drawingml/2006/main" xmlns:r="http://schemas.openxmlformats.org/officeDocument/2006/relationships" xmlns:p="http://schemas.openxmlformats.org/presentationml/2006/main">
-  <p:cSld>
-    <p:spTree>
-      <p:nvGrpSpPr>
-        <p:cNvPr id="1" name=""/>
-        <p:cNvGrpSpPr/>
-        <p:nvPr/>
-      </p:nvGrpSpPr>
-      <p:grpSpPr>
-        <a:xfrm>
-          <a:off x="0" y="0"/>
-          <a:ext cx="0" cy="0"/>
-          <a:chOff x="0" y="0"/>
-          <a:chExt cx="0" cy="0"/>
-        </a:xfrm>
-      </p:grpSpPr>
-      <p:sp>
-        <p:nvSpPr>
-          <p:cNvPr id="2" name="Title 1"/>
-          <p:cNvSpPr>
-            <a:spLocks noGrp="1"/>
-          </p:cNvSpPr>
-          <p:nvPr>
-            <p:ph type="title"/>
-          </p:nvPr>
-        </p:nvSpPr>
-        <p:spPr/>
-        <p:txBody>
-          <a:bodyPr/>
-          <a:lstStyle/>
-          <a:p>
-            <a:r>
-              <a:rPr lang="en-US" dirty="0" smtClean="0"/>
-              <a:t>Chopin </a:t>
-            </a:r>
-            <a:r>
-              <a:rPr lang="mr-IN" dirty="0" smtClean="0"/>
-              <a:t>–</a:t>
-            </a:r>
-            <a:r>
-              <a:rPr lang="en-US" dirty="0" smtClean="0"/>
-              <a:t> “Prelude #4”</a:t>
-            </a:r>
-            <a:endParaRPr lang="en-US" dirty="0"/>
-          </a:p>
-        </p:txBody>
-      </p:sp>
-      <p:pic>
-        <p:nvPicPr>
-          <p:cNvPr id="4" name="Content Placeholder 3"/>
-          <p:cNvPicPr>
-            <a:picLocks noGrp="1" noChangeAspect="1"/>
-          </p:cNvPicPr>
-          <p:nvPr>
-            <p:ph idx="1"/>
-          </p:nvPr>
-        </p:nvPicPr>
-        <p:blipFill>
-          <a:blip r:embed="rId2">
-            <a:extLst>
-              <a:ext uri="{28A0092B-C50C-407E-A947-70E740481C1C}">
-                <a14:useLocalDpi xmlns:a14="http://schemas.microsoft.com/office/drawing/2010/main" val="0"/>
-              </a:ext>
-            </a:extLst>
-          </a:blip>
-          <a:stretch>
-            <a:fillRect/>
-          </a:stretch>
-        </p:blipFill>
-        <p:spPr>
-          <a:xfrm>
-            <a:off x="457202" y="2355759"/>
-            <a:ext cx="6029690" cy="3014845"/>
-          </a:xfrm>
-        </p:spPr>
-      </p:pic>
-      <p:pic>
-        <p:nvPicPr>
-          <p:cNvPr id="3" name="Picture 2"/>
-          <p:cNvPicPr>
-            <a:picLocks noChangeAspect="1"/>
-          </p:cNvPicPr>
-          <p:nvPr/>
-        </p:nvPicPr>
-        <p:blipFill rotWithShape="1">
-          <a:blip r:embed="rId3"/>
-          <a:srcRect b="29426"/>
-          <a:stretch/>
-        </p:blipFill>
-        <p:spPr>
-          <a:xfrm>
-            <a:off x="6589861" y="1417638"/>
-            <a:ext cx="2221814" cy="4839932"/>
-          </a:xfrm>
-          <a:prstGeom prst="rect">
-            <a:avLst/>
-          </a:prstGeom>
-        </p:spPr>
-      </p:pic>
-    </p:spTree>
-    <p:extLst>
-      <p:ext uri="{BB962C8B-B14F-4D97-AF65-F5344CB8AC3E}">
-        <p14:creationId xmlns:p14="http://schemas.microsoft.com/office/powerpoint/2010/main" val="3265440676"/>
-      </p:ext>
-    </p:extLst>
-  </p:cSld>
-  <p:clrMapOvr>
-    <a:masterClrMapping/>
-  </p:clrMapOvr>
-</p:sld>
-</file>
-
-<file path=ppt/slides/slide7.xml><?xml version="1.0" encoding="utf-8"?>
-<p:sld xmlns:a="http://schemas.openxmlformats.org/drawingml/2006/main" xmlns:r="http://schemas.openxmlformats.org/officeDocument/2006/relationships" xmlns:p="http://schemas.openxmlformats.org/presentationml/2006/main">
-  <p:cSld>
-    <p:spTree>
-      <p:nvGrpSpPr>
-        <p:cNvPr id="1" name=""/>
-        <p:cNvGrpSpPr/>
-        <p:nvPr/>
-      </p:nvGrpSpPr>
-      <p:grpSpPr>
-        <a:xfrm>
-          <a:off x="0" y="0"/>
-          <a:ext cx="0" cy="0"/>
-          <a:chOff x="0" y="0"/>
-          <a:chExt cx="0" cy="0"/>
-        </a:xfrm>
-      </p:grpSpPr>
-      <p:sp>
-        <p:nvSpPr>
-          <p:cNvPr id="2" name="Title 1"/>
-          <p:cNvSpPr>
-            <a:spLocks noGrp="1"/>
-          </p:cNvSpPr>
-          <p:nvPr>
-            <p:ph type="title"/>
-          </p:nvPr>
-        </p:nvSpPr>
-        <p:spPr/>
-        <p:txBody>
-          <a:bodyPr/>
-          <a:lstStyle/>
-          <a:p>
-            <a:r>
-              <a:rPr lang="en-US" dirty="0" err="1" smtClean="0"/>
-              <a:t>Ryoji</a:t>
-            </a:r>
-            <a:r>
-              <a:rPr lang="en-US" dirty="0" smtClean="0"/>
-              <a:t> Ikeda </a:t>
-            </a:r>
-            <a:r>
-              <a:rPr lang="mr-IN" dirty="0" smtClean="0"/>
-              <a:t>–</a:t>
-            </a:r>
-            <a:r>
-              <a:rPr lang="en-US" dirty="0" smtClean="0"/>
-              <a:t> “</a:t>
-            </a:r>
-            <a:r>
-              <a:rPr lang="en-US" dirty="0" err="1" smtClean="0"/>
-              <a:t>data.convex</a:t>
-            </a:r>
-            <a:r>
-              <a:rPr lang="en-US" dirty="0" smtClean="0"/>
-              <a:t>”</a:t>
-            </a:r>
-            <a:endParaRPr lang="en-US" dirty="0"/>
-          </a:p>
-        </p:txBody>
-      </p:sp>
-      <p:pic>
-        <p:nvPicPr>
-          <p:cNvPr id="4" name="Content Placeholder 3"/>
-          <p:cNvPicPr>
-            <a:picLocks noGrp="1" noChangeAspect="1"/>
-          </p:cNvPicPr>
-          <p:nvPr>
-            <p:ph idx="1"/>
-          </p:nvPr>
-        </p:nvPicPr>
-        <p:blipFill>
-          <a:blip r:embed="rId2">
-            <a:extLst>
-              <a:ext uri="{28A0092B-C50C-407E-A947-70E740481C1C}">
-                <a14:useLocalDpi xmlns:a14="http://schemas.microsoft.com/office/drawing/2010/main" val="0"/>
-              </a:ext>
-            </a:extLst>
-          </a:blip>
-          <a:stretch>
-            <a:fillRect/>
-          </a:stretch>
-        </p:blipFill>
-        <p:spPr>
-          <a:xfrm>
-            <a:off x="457202" y="2355759"/>
-            <a:ext cx="6029690" cy="3014845"/>
-          </a:xfrm>
-        </p:spPr>
-      </p:pic>
-      <p:pic>
-        <p:nvPicPr>
-          <p:cNvPr id="5" name="Picture 4"/>
-          <p:cNvPicPr>
-            <a:picLocks noChangeAspect="1"/>
-          </p:cNvPicPr>
-          <p:nvPr/>
-        </p:nvPicPr>
-        <p:blipFill rotWithShape="1">
-          <a:blip r:embed="rId3"/>
-          <a:srcRect b="29426"/>
-          <a:stretch/>
-        </p:blipFill>
-        <p:spPr>
-          <a:xfrm>
-            <a:off x="6589861" y="1417638"/>
-            <a:ext cx="2221814" cy="4839932"/>
-          </a:xfrm>
-          <a:prstGeom prst="rect">
-            <a:avLst/>
-          </a:prstGeom>
-        </p:spPr>
-      </p:pic>
-    </p:spTree>
-    <p:extLst>
-      <p:ext uri="{BB962C8B-B14F-4D97-AF65-F5344CB8AC3E}">
-        <p14:creationId xmlns:p14="http://schemas.microsoft.com/office/powerpoint/2010/main" val="578780899"/>
-      </p:ext>
-    </p:extLst>
-  </p:cSld>
-  <p:clrMapOvr>
-    <a:masterClrMapping/>
-  </p:clrMapOvr>
-</p:sld>
-</file>
-
-<file path=ppt/slides/slide8.xml><?xml version="1.0" encoding="utf-8"?>
-<p:sld xmlns:a="http://schemas.openxmlformats.org/drawingml/2006/main" xmlns:r="http://schemas.openxmlformats.org/officeDocument/2006/relationships" xmlns:p="http://schemas.openxmlformats.org/presentationml/2006/main">
-  <p:cSld>
-    <p:spTree>
-      <p:nvGrpSpPr>
-        <p:cNvPr id="1" name=""/>
-        <p:cNvGrpSpPr/>
-        <p:nvPr/>
-      </p:nvGrpSpPr>
-      <p:grpSpPr>
-        <a:xfrm>
-          <a:off x="0" y="0"/>
-          <a:ext cx="0" cy="0"/>
-          <a:chOff x="0" y="0"/>
-          <a:chExt cx="0" cy="0"/>
-        </a:xfrm>
-      </p:grpSpPr>
-      <p:sp>
-        <p:nvSpPr>
-          <p:cNvPr id="4" name="Title 3"/>
-          <p:cNvSpPr>
-            <a:spLocks noGrp="1"/>
-          </p:cNvSpPr>
-          <p:nvPr>
-            <p:ph type="ctrTitle"/>
-          </p:nvPr>
-        </p:nvSpPr>
-        <p:spPr>
-          <a:xfrm>
-            <a:off x="685800" y="2702521"/>
-            <a:ext cx="7772400" cy="1470025"/>
-          </a:xfrm>
-        </p:spPr>
-        <p:txBody>
-          <a:bodyPr/>
-          <a:lstStyle/>
-          <a:p>
-            <a:r>
-              <a:rPr lang="en-US" dirty="0" smtClean="0"/>
-              <a:t>Tests</a:t>
-            </a:r>
-            <a:endParaRPr lang="en-US" dirty="0"/>
-          </a:p>
-        </p:txBody>
-      </p:sp>
-    </p:spTree>
-    <p:extLst>
-      <p:ext uri="{BB962C8B-B14F-4D97-AF65-F5344CB8AC3E}">
-        <p14:creationId xmlns:p14="http://schemas.microsoft.com/office/powerpoint/2010/main" val="2224528631"/>
-      </p:ext>
-    </p:extLst>
-  </p:cSld>
-  <p:clrMapOvr>
-    <a:masterClrMapping/>
-  </p:clrMapOvr>
-</p:sld>
-</file>
-
-<file path=ppt/slides/slide9.xml><?xml version="1.0" encoding="utf-8"?>
-<p:sld xmlns:a="http://schemas.openxmlformats.org/drawingml/2006/main" xmlns:r="http://schemas.openxmlformats.org/officeDocument/2006/relationships" xmlns:p="http://schemas.openxmlformats.org/presentationml/2006/main">
-  <p:cSld>
-    <p:spTree>
-      <p:nvGrpSpPr>
-        <p:cNvPr id="1" name=""/>
-        <p:cNvGrpSpPr/>
-        <p:nvPr/>
-      </p:nvGrpSpPr>
-      <p:grpSpPr>
-        <a:xfrm>
-          <a:off x="0" y="0"/>
-          <a:ext cx="0" cy="0"/>
-          <a:chOff x="0" y="0"/>
-          <a:chExt cx="0" cy="0"/>
-        </a:xfrm>
-      </p:grpSpPr>
-      <p:sp>
-        <p:nvSpPr>
-          <p:cNvPr id="2" name="Title 1"/>
-          <p:cNvSpPr>
-            <a:spLocks noGrp="1"/>
-          </p:cNvSpPr>
-          <p:nvPr>
-            <p:ph type="title"/>
-          </p:nvPr>
-        </p:nvSpPr>
-        <p:spPr/>
-        <p:txBody>
-          <a:bodyPr/>
-          <a:lstStyle/>
-          <a:p>
-            <a:r>
-              <a:rPr lang="en-US" dirty="0" smtClean="0"/>
-              <a:t>White Noise</a:t>
-            </a:r>
-            <a:endParaRPr lang="en-US" dirty="0"/>
-          </a:p>
-        </p:txBody>
-      </p:sp>
-      <p:pic>
-        <p:nvPicPr>
-          <p:cNvPr id="4" name="Content Placeholder 3" descr="whitenoise_hist.png"/>
-          <p:cNvPicPr>
-            <a:picLocks noGrp="1" noChangeAspect="1"/>
-          </p:cNvPicPr>
-          <p:nvPr>
-            <p:ph idx="1"/>
-          </p:nvPr>
-        </p:nvPicPr>
-        <p:blipFill>
-          <a:blip r:embed="rId2">
-            <a:extLst>
-              <a:ext uri="{28A0092B-C50C-407E-A947-70E740481C1C}">
-                <a14:useLocalDpi xmlns:a14="http://schemas.microsoft.com/office/drawing/2010/main" val="0"/>
-              </a:ext>
-            </a:extLst>
-          </a:blip>
-          <a:srcRect t="-4996" b="-4996"/>
-          <a:stretch>
-            <a:fillRect/>
-          </a:stretch>
-        </p:blipFill>
-        <p:spPr>
-          <a:xfrm>
-            <a:off x="457202" y="1600200"/>
-            <a:ext cx="6029690" cy="4525963"/>
-          </a:xfrm>
-        </p:spPr>
-      </p:pic>
-      <p:pic>
-        <p:nvPicPr>
-          <p:cNvPr id="5" name="Picture 4"/>
-          <p:cNvPicPr>
-            <a:picLocks noChangeAspect="1"/>
-          </p:cNvPicPr>
-          <p:nvPr/>
-        </p:nvPicPr>
-        <p:blipFill rotWithShape="1">
-          <a:blip r:embed="rId3"/>
-          <a:srcRect b="29426"/>
-          <a:stretch/>
-        </p:blipFill>
-        <p:spPr>
-          <a:xfrm>
-            <a:off x="6589861" y="1417638"/>
-            <a:ext cx="2221814" cy="4839932"/>
-          </a:xfrm>
-          <a:prstGeom prst="rect">
-            <a:avLst/>
-          </a:prstGeom>
-        </p:spPr>
-      </p:pic>
-    </p:spTree>
-    <p:extLst>
-      <p:ext uri="{BB962C8B-B14F-4D97-AF65-F5344CB8AC3E}">
-        <p14:creationId xmlns:p14="http://schemas.microsoft.com/office/powerpoint/2010/main" val="1351318650"/>
       </p:ext>
     </p:extLst>
   </p:cSld>

</xml_diff>